<commit_message>
v1.1./Fixed bug of the initial positions of Jansen's linkage./bug fix for the fixed nodes color./wheel tuning./line width/
</commit_message>
<xml_diff>
--- a/linksim/linksim.pptx
+++ b/linksim/linksim.pptx
@@ -13492,6 +13492,8 @@
                         <a14:backgroundMark x1="68636" y1="61371" x2="91818" y2="27103"/>
                         <a14:backgroundMark x1="40000" y1="5296" x2="47273" y2="0"/>
                         <a14:backgroundMark x1="47273" y1="31464" x2="47273" y2="0"/>
+                        <a14:backgroundMark x1="68636" y1="59190" x2="63636" y2="56075"/>
+                        <a14:backgroundMark x1="49091" y1="34891" x2="61818" y2="52025"/>
                       </a14:backgroundRemoval>
                     </a14:imgEffect>
                   </a14:imgLayer>
@@ -13508,7 +13510,7 @@
         </p:blipFill>
         <p:spPr>
           <a:xfrm>
-            <a:off x="5421942" y="1060521"/>
+            <a:off x="5429552" y="1050572"/>
             <a:ext cx="3471357" cy="5065025"/>
           </a:xfrm>
           <a:prstGeom prst="rect">
@@ -14093,6 +14095,454 @@
               <a:t>7</a:t>
             </a:r>
             <a:endParaRPr kumimoji="1" lang="ja-JP" altLang="en-US" dirty="0"/>
+          </a:p>
+        </p:txBody>
+      </p:sp>
+      <p:sp>
+        <p:nvSpPr>
+          <p:cNvPr id="285" name="テキスト ボックス 284"/>
+          <p:cNvSpPr txBox="1"/>
+          <p:nvPr/>
+        </p:nvSpPr>
+        <p:spPr>
+          <a:xfrm>
+            <a:off x="8574796" y="2319801"/>
+            <a:ext cx="301686" cy="369332"/>
+          </a:xfrm>
+          <a:prstGeom prst="rect">
+            <a:avLst/>
+          </a:prstGeom>
+          <a:noFill/>
+        </p:spPr>
+        <p:txBody>
+          <a:bodyPr wrap="none" rtlCol="0">
+            <a:spAutoFit/>
+          </a:bodyPr>
+          <a:lstStyle/>
+          <a:p>
+            <a:r>
+              <a:rPr kumimoji="1" lang="en-US" altLang="ja-JP" dirty="0" smtClean="0"/>
+              <a:t>0</a:t>
+            </a:r>
+            <a:endParaRPr kumimoji="1" lang="ja-JP" altLang="en-US" dirty="0"/>
+          </a:p>
+        </p:txBody>
+      </p:sp>
+      <p:sp>
+        <p:nvSpPr>
+          <p:cNvPr id="286" name="テキスト ボックス 285"/>
+          <p:cNvSpPr txBox="1"/>
+          <p:nvPr/>
+        </p:nvSpPr>
+        <p:spPr>
+          <a:xfrm>
+            <a:off x="7831522" y="3004804"/>
+            <a:ext cx="593432" cy="369332"/>
+          </a:xfrm>
+          <a:prstGeom prst="rect">
+            <a:avLst/>
+          </a:prstGeom>
+          <a:noFill/>
+        </p:spPr>
+        <p:txBody>
+          <a:bodyPr wrap="none" rtlCol="0">
+            <a:spAutoFit/>
+          </a:bodyPr>
+          <a:lstStyle/>
+          <a:p>
+            <a:r>
+              <a:rPr kumimoji="1" lang="en-US" altLang="ja-JP" dirty="0" smtClean="0">
+                <a:solidFill>
+                  <a:srgbClr val="FF0000"/>
+                </a:solidFill>
+              </a:rPr>
+              <a:t>61.9</a:t>
+            </a:r>
+            <a:endParaRPr kumimoji="1" lang="ja-JP" altLang="en-US" dirty="0">
+              <a:solidFill>
+                <a:srgbClr val="FF0000"/>
+              </a:solidFill>
+            </a:endParaRPr>
+          </a:p>
+        </p:txBody>
+      </p:sp>
+      <p:sp>
+        <p:nvSpPr>
+          <p:cNvPr id="287" name="テキスト ボックス 286"/>
+          <p:cNvSpPr txBox="1"/>
+          <p:nvPr/>
+        </p:nvSpPr>
+        <p:spPr>
+          <a:xfrm>
+            <a:off x="7249159" y="1193326"/>
+            <a:ext cx="418704" cy="369332"/>
+          </a:xfrm>
+          <a:prstGeom prst="rect">
+            <a:avLst/>
+          </a:prstGeom>
+          <a:noFill/>
+        </p:spPr>
+        <p:txBody>
+          <a:bodyPr wrap="none" rtlCol="0">
+            <a:spAutoFit/>
+          </a:bodyPr>
+          <a:lstStyle/>
+          <a:p>
+            <a:r>
+              <a:rPr kumimoji="1" lang="en-US" altLang="ja-JP" dirty="0" smtClean="0">
+                <a:solidFill>
+                  <a:srgbClr val="FF0000"/>
+                </a:solidFill>
+              </a:rPr>
+              <a:t>50</a:t>
+            </a:r>
+            <a:endParaRPr kumimoji="1" lang="ja-JP" altLang="en-US" dirty="0">
+              <a:solidFill>
+                <a:srgbClr val="FF0000"/>
+              </a:solidFill>
+            </a:endParaRPr>
+          </a:p>
+        </p:txBody>
+      </p:sp>
+      <p:sp>
+        <p:nvSpPr>
+          <p:cNvPr id="288" name="テキスト ボックス 287"/>
+          <p:cNvSpPr txBox="1"/>
+          <p:nvPr/>
+        </p:nvSpPr>
+        <p:spPr>
+          <a:xfrm>
+            <a:off x="6666796" y="-618152"/>
+            <a:ext cx="593432" cy="369332"/>
+          </a:xfrm>
+          <a:prstGeom prst="rect">
+            <a:avLst/>
+          </a:prstGeom>
+          <a:noFill/>
+        </p:spPr>
+        <p:txBody>
+          <a:bodyPr wrap="none" rtlCol="0">
+            <a:spAutoFit/>
+          </a:bodyPr>
+          <a:lstStyle/>
+          <a:p>
+            <a:r>
+              <a:rPr kumimoji="1" lang="en-US" altLang="ja-JP" dirty="0" smtClean="0">
+                <a:solidFill>
+                  <a:srgbClr val="FF0000"/>
+                </a:solidFill>
+              </a:rPr>
+              <a:t>61.9</a:t>
+            </a:r>
+            <a:endParaRPr kumimoji="1" lang="ja-JP" altLang="en-US" dirty="0">
+              <a:solidFill>
+                <a:srgbClr val="FF0000"/>
+              </a:solidFill>
+            </a:endParaRPr>
+          </a:p>
+        </p:txBody>
+      </p:sp>
+      <p:sp>
+        <p:nvSpPr>
+          <p:cNvPr id="289" name="テキスト ボックス 288"/>
+          <p:cNvSpPr txBox="1"/>
+          <p:nvPr/>
+        </p:nvSpPr>
+        <p:spPr>
+          <a:xfrm>
+            <a:off x="5429552" y="1879495"/>
+            <a:ext cx="593432" cy="369332"/>
+          </a:xfrm>
+          <a:prstGeom prst="rect">
+            <a:avLst/>
+          </a:prstGeom>
+          <a:noFill/>
+        </p:spPr>
+        <p:txBody>
+          <a:bodyPr wrap="none" rtlCol="0">
+            <a:spAutoFit/>
+          </a:bodyPr>
+          <a:lstStyle/>
+          <a:p>
+            <a:r>
+              <a:rPr kumimoji="1" lang="en-US" altLang="ja-JP" dirty="0" smtClean="0">
+                <a:solidFill>
+                  <a:srgbClr val="FF0000"/>
+                </a:solidFill>
+              </a:rPr>
+              <a:t>55.8</a:t>
+            </a:r>
+            <a:endParaRPr kumimoji="1" lang="ja-JP" altLang="en-US" dirty="0">
+              <a:solidFill>
+                <a:srgbClr val="FF0000"/>
+              </a:solidFill>
+            </a:endParaRPr>
+          </a:p>
+        </p:txBody>
+      </p:sp>
+      <p:sp>
+        <p:nvSpPr>
+          <p:cNvPr id="290" name="テキスト ボックス 289"/>
+          <p:cNvSpPr txBox="1"/>
+          <p:nvPr/>
+        </p:nvSpPr>
+        <p:spPr>
+          <a:xfrm>
+            <a:off x="6760091" y="4471189"/>
+            <a:ext cx="593432" cy="369332"/>
+          </a:xfrm>
+          <a:prstGeom prst="rect">
+            <a:avLst/>
+          </a:prstGeom>
+          <a:noFill/>
+        </p:spPr>
+        <p:txBody>
+          <a:bodyPr wrap="none" rtlCol="0">
+            <a:spAutoFit/>
+          </a:bodyPr>
+          <a:lstStyle/>
+          <a:p>
+            <a:r>
+              <a:rPr kumimoji="1" lang="en-US" altLang="ja-JP" dirty="0" smtClean="0">
+                <a:solidFill>
+                  <a:srgbClr val="FF0000"/>
+                </a:solidFill>
+              </a:rPr>
+              <a:t>36.7</a:t>
+            </a:r>
+            <a:endParaRPr kumimoji="1" lang="ja-JP" altLang="en-US" dirty="0">
+              <a:solidFill>
+                <a:srgbClr val="FF0000"/>
+              </a:solidFill>
+            </a:endParaRPr>
+          </a:p>
+        </p:txBody>
+      </p:sp>
+      <p:sp>
+        <p:nvSpPr>
+          <p:cNvPr id="291" name="テキスト ボックス 290"/>
+          <p:cNvSpPr txBox="1"/>
+          <p:nvPr/>
+        </p:nvSpPr>
+        <p:spPr>
+          <a:xfrm>
+            <a:off x="6816725" y="1735472"/>
+            <a:ext cx="593432" cy="369332"/>
+          </a:xfrm>
+          <a:prstGeom prst="rect">
+            <a:avLst/>
+          </a:prstGeom>
+          <a:noFill/>
+        </p:spPr>
+        <p:txBody>
+          <a:bodyPr wrap="none" rtlCol="0">
+            <a:spAutoFit/>
+          </a:bodyPr>
+          <a:lstStyle/>
+          <a:p>
+            <a:r>
+              <a:rPr lang="en-US" altLang="ja-JP" dirty="0" smtClean="0">
+                <a:solidFill>
+                  <a:srgbClr val="FF0000"/>
+                </a:solidFill>
+              </a:rPr>
+              <a:t>41.5</a:t>
+            </a:r>
+            <a:endParaRPr kumimoji="1" lang="ja-JP" altLang="en-US" dirty="0">
+              <a:solidFill>
+                <a:srgbClr val="FF0000"/>
+              </a:solidFill>
+            </a:endParaRPr>
+          </a:p>
+        </p:txBody>
+      </p:sp>
+      <p:sp>
+        <p:nvSpPr>
+          <p:cNvPr id="292" name="テキスト ボックス 291"/>
+          <p:cNvSpPr txBox="1"/>
+          <p:nvPr/>
+        </p:nvSpPr>
+        <p:spPr>
+          <a:xfrm>
+            <a:off x="6646814" y="5394479"/>
+            <a:ext cx="593432" cy="369332"/>
+          </a:xfrm>
+          <a:prstGeom prst="rect">
+            <a:avLst/>
+          </a:prstGeom>
+          <a:noFill/>
+        </p:spPr>
+        <p:txBody>
+          <a:bodyPr wrap="none" rtlCol="0">
+            <a:spAutoFit/>
+          </a:bodyPr>
+          <a:lstStyle/>
+          <a:p>
+            <a:r>
+              <a:rPr kumimoji="1" lang="en-US" altLang="ja-JP" dirty="0" smtClean="0">
+                <a:solidFill>
+                  <a:srgbClr val="FF0000"/>
+                </a:solidFill>
+              </a:rPr>
+              <a:t>65.7</a:t>
+            </a:r>
+            <a:endParaRPr kumimoji="1" lang="ja-JP" altLang="en-US" dirty="0">
+              <a:solidFill>
+                <a:srgbClr val="FF0000"/>
+              </a:solidFill>
+            </a:endParaRPr>
+          </a:p>
+        </p:txBody>
+      </p:sp>
+      <p:sp>
+        <p:nvSpPr>
+          <p:cNvPr id="293" name="テキスト ボックス 292"/>
+          <p:cNvSpPr txBox="1"/>
+          <p:nvPr/>
+        </p:nvSpPr>
+        <p:spPr>
+          <a:xfrm>
+            <a:off x="6116917" y="2900766"/>
+            <a:ext cx="593432" cy="369332"/>
+          </a:xfrm>
+          <a:prstGeom prst="rect">
+            <a:avLst/>
+          </a:prstGeom>
+          <a:noFill/>
+        </p:spPr>
+        <p:txBody>
+          <a:bodyPr wrap="none" rtlCol="0">
+            <a:spAutoFit/>
+          </a:bodyPr>
+          <a:lstStyle/>
+          <a:p>
+            <a:r>
+              <a:rPr kumimoji="1" lang="en-US" altLang="ja-JP" dirty="0" smtClean="0">
+                <a:solidFill>
+                  <a:srgbClr val="FF0000"/>
+                </a:solidFill>
+              </a:rPr>
+              <a:t>40.1</a:t>
+            </a:r>
+            <a:endParaRPr kumimoji="1" lang="ja-JP" altLang="en-US" dirty="0">
+              <a:solidFill>
+                <a:srgbClr val="FF0000"/>
+              </a:solidFill>
+            </a:endParaRPr>
+          </a:p>
+        </p:txBody>
+      </p:sp>
+      <p:sp>
+        <p:nvSpPr>
+          <p:cNvPr id="294" name="テキスト ボックス 293"/>
+          <p:cNvSpPr txBox="1"/>
+          <p:nvPr/>
+        </p:nvSpPr>
+        <p:spPr>
+          <a:xfrm>
+            <a:off x="5155278" y="3865366"/>
+            <a:ext cx="593432" cy="369332"/>
+          </a:xfrm>
+          <a:prstGeom prst="rect">
+            <a:avLst/>
+          </a:prstGeom>
+          <a:noFill/>
+        </p:spPr>
+        <p:txBody>
+          <a:bodyPr wrap="none" rtlCol="0">
+            <a:spAutoFit/>
+          </a:bodyPr>
+          <a:lstStyle/>
+          <a:p>
+            <a:r>
+              <a:rPr kumimoji="1" lang="en-US" altLang="ja-JP" dirty="0" smtClean="0">
+                <a:solidFill>
+                  <a:srgbClr val="FF0000"/>
+                </a:solidFill>
+              </a:rPr>
+              <a:t>39.4</a:t>
+            </a:r>
+            <a:endParaRPr kumimoji="1" lang="ja-JP" altLang="en-US" dirty="0">
+              <a:solidFill>
+                <a:srgbClr val="FF0000"/>
+              </a:solidFill>
+            </a:endParaRPr>
+          </a:p>
+        </p:txBody>
+      </p:sp>
+      <p:sp>
+        <p:nvSpPr>
+          <p:cNvPr id="295" name="テキスト ボックス 294"/>
+          <p:cNvSpPr txBox="1"/>
+          <p:nvPr/>
+        </p:nvSpPr>
+        <p:spPr>
+          <a:xfrm>
+            <a:off x="7885885" y="4632982"/>
+            <a:ext cx="593432" cy="369332"/>
+          </a:xfrm>
+          <a:prstGeom prst="rect">
+            <a:avLst/>
+          </a:prstGeom>
+          <a:noFill/>
+        </p:spPr>
+        <p:txBody>
+          <a:bodyPr wrap="none" rtlCol="0">
+            <a:spAutoFit/>
+          </a:bodyPr>
+          <a:lstStyle/>
+          <a:p>
+            <a:r>
+              <a:rPr kumimoji="1" lang="en-US" altLang="ja-JP" dirty="0" smtClean="0">
+                <a:solidFill>
+                  <a:srgbClr val="FF0000"/>
+                </a:solidFill>
+              </a:rPr>
+              <a:t>49.0</a:t>
+            </a:r>
+            <a:endParaRPr kumimoji="1" lang="ja-JP" altLang="en-US" dirty="0">
+              <a:solidFill>
+                <a:srgbClr val="FF0000"/>
+              </a:solidFill>
+            </a:endParaRPr>
+          </a:p>
+        </p:txBody>
+      </p:sp>
+      <p:sp>
+        <p:nvSpPr>
+          <p:cNvPr id="296" name="テキスト ボックス 295"/>
+          <p:cNvSpPr txBox="1"/>
+          <p:nvPr/>
+        </p:nvSpPr>
+        <p:spPr>
+          <a:xfrm>
+            <a:off x="6591737" y="3266664"/>
+            <a:ext cx="593432" cy="369332"/>
+          </a:xfrm>
+          <a:prstGeom prst="rect">
+            <a:avLst/>
+          </a:prstGeom>
+          <a:noFill/>
+        </p:spPr>
+        <p:txBody>
+          <a:bodyPr wrap="none" rtlCol="0">
+            <a:spAutoFit/>
+          </a:bodyPr>
+          <a:lstStyle/>
+          <a:p>
+            <a:r>
+              <a:rPr kumimoji="1" lang="en-US" altLang="ja-JP" dirty="0" smtClean="0">
+                <a:solidFill>
+                  <a:srgbClr val="FF0000"/>
+                </a:solidFill>
+              </a:rPr>
+              <a:t>39.3</a:t>
+            </a:r>
+            <a:endParaRPr kumimoji="1" lang="ja-JP" altLang="en-US" dirty="0">
+              <a:solidFill>
+                <a:srgbClr val="FF0000"/>
+              </a:solidFill>
+            </a:endParaRPr>
           </a:p>
         </p:txBody>
       </p:sp>

</xml_diff>